<commit_message>
REINFORCE algorithm - changes after lesson
</commit_message>
<xml_diff>
--- a/RL/02 - Deep Reinforcement Learning/02 - 03 Policy Gradient (PG) алгоритм/Policy Gradient.pptx
+++ b/RL/02 - Deep Reinforcement Learning/02 - 03 Policy Gradient (PG) алгоритм/Policy Gradient.pptx
@@ -19317,8 +19317,8 @@
           </a:p>
         </p:txBody>
       </p:sp>
-      <mc:AlternateContent xmlns:mc="http://schemas.openxmlformats.org/markup-compatibility/2006" xmlns:a14="http://schemas.microsoft.com/office/drawing/2010/main">
-        <mc:Choice Requires="a14">
+      <mc:AlternateContent xmlns:mc="http://schemas.openxmlformats.org/markup-compatibility/2006">
+        <mc:Choice xmlns:a14="http://schemas.microsoft.com/office/drawing/2010/main" Requires="a14">
           <p:sp>
             <p:nvSpPr>
               <p:cNvPr id="7" name="Google Shape;311;p57">
@@ -19338,7 +19338,7 @@
             <p:spPr>
               <a:xfrm>
                 <a:off x="122850" y="1032459"/>
-                <a:ext cx="8801144" cy="3478172"/>
+                <a:ext cx="8801144" cy="3656142"/>
               </a:xfrm>
               <a:prstGeom prst="rect">
                 <a:avLst/>
@@ -19927,10 +19927,296 @@
                   <a:latin typeface="Helvetica Neue" panose="02000503000000020004" pitchFamily="2" charset="0"/>
                 </a:endParaRPr>
               </a:p>
+              <a:p>
+                <a:pPr marL="133350" indent="0" algn="ctr">
+                  <a:buNone/>
+                </a:pPr>
+                <a14:m>
+                  <m:oMath xmlns:m="http://schemas.openxmlformats.org/officeDocument/2006/math">
+                    <m:r>
+                      <a:rPr lang="en-US" sz="1400" i="1" smtClean="0">
+                        <a:solidFill>
+                          <a:srgbClr val="000000"/>
+                        </a:solidFill>
+                        <a:latin typeface="Cambria Math" panose="02040503050406030204" pitchFamily="18" charset="0"/>
+                      </a:rPr>
+                      <m:t>𝐽</m:t>
+                    </m:r>
+                    <m:d>
+                      <m:dPr>
+                        <m:ctrlPr>
+                          <a:rPr lang="en-US" sz="1400" i="1">
+                            <a:solidFill>
+                              <a:srgbClr val="000000"/>
+                            </a:solidFill>
+                            <a:latin typeface="Cambria Math" panose="02040503050406030204" pitchFamily="18" charset="0"/>
+                          </a:rPr>
+                        </m:ctrlPr>
+                      </m:dPr>
+                      <m:e>
+                        <m:r>
+                          <a:rPr lang="en-US" sz="1400" i="1">
+                            <a:solidFill>
+                              <a:srgbClr val="000000"/>
+                            </a:solidFill>
+                            <a:latin typeface="Cambria Math" panose="02040503050406030204" pitchFamily="18" charset="0"/>
+                          </a:rPr>
+                          <m:t>𝜂</m:t>
+                        </m:r>
+                      </m:e>
+                    </m:d>
+                    <m:r>
+                      <a:rPr lang="en-US" sz="1400" b="0" i="1" smtClean="0">
+                        <a:solidFill>
+                          <a:srgbClr val="000000"/>
+                        </a:solidFill>
+                        <a:latin typeface="Cambria Math" panose="02040503050406030204" pitchFamily="18" charset="0"/>
+                      </a:rPr>
+                      <m:t>=</m:t>
+                    </m:r>
+                    <m:f>
+                      <m:fPr>
+                        <m:ctrlPr>
+                          <a:rPr lang="en-US" sz="1400" b="0" i="1" smtClean="0">
+                            <a:solidFill>
+                              <a:srgbClr val="000000"/>
+                            </a:solidFill>
+                            <a:latin typeface="Cambria Math" panose="02040503050406030204" pitchFamily="18" charset="0"/>
+                          </a:rPr>
+                        </m:ctrlPr>
+                      </m:fPr>
+                      <m:num>
+                        <m:r>
+                          <a:rPr lang="en-US" sz="1400" b="0" i="1" smtClean="0">
+                            <a:solidFill>
+                              <a:srgbClr val="000000"/>
+                            </a:solidFill>
+                            <a:latin typeface="Cambria Math" panose="02040503050406030204" pitchFamily="18" charset="0"/>
+                          </a:rPr>
+                          <m:t>1</m:t>
+                        </m:r>
+                      </m:num>
+                      <m:den>
+                        <m:r>
+                          <a:rPr lang="en-US" sz="1400" b="0" i="1" smtClean="0">
+                            <a:solidFill>
+                              <a:srgbClr val="000000"/>
+                            </a:solidFill>
+                            <a:latin typeface="Cambria Math" panose="02040503050406030204" pitchFamily="18" charset="0"/>
+                          </a:rPr>
+                          <m:t>𝑁</m:t>
+                        </m:r>
+                      </m:den>
+                    </m:f>
+                    <m:nary>
+                      <m:naryPr>
+                        <m:chr m:val="∑"/>
+                        <m:supHide m:val="on"/>
+                        <m:ctrlPr>
+                          <a:rPr lang="en-US" sz="1400" b="0" i="1" smtClean="0">
+                            <a:solidFill>
+                              <a:srgbClr val="000000"/>
+                            </a:solidFill>
+                            <a:latin typeface="Cambria Math" panose="02040503050406030204" pitchFamily="18" charset="0"/>
+                          </a:rPr>
+                        </m:ctrlPr>
+                      </m:naryPr>
+                      <m:sub>
+                        <m:r>
+                          <m:rPr>
+                            <m:brk m:alnAt="7"/>
+                          </m:rPr>
+                          <a:rPr lang="en-US" sz="1400" b="0" i="1" smtClean="0">
+                            <a:solidFill>
+                              <a:srgbClr val="000000"/>
+                            </a:solidFill>
+                            <a:latin typeface="Cambria Math" panose="02040503050406030204" pitchFamily="18" charset="0"/>
+                          </a:rPr>
+                          <m:t>𝑘</m:t>
+                        </m:r>
+                      </m:sub>
+                      <m:sup/>
+                      <m:e>
+                        <m:r>
+                          <a:rPr lang="en-US" sz="1400" b="0" i="1" smtClean="0">
+                            <a:solidFill>
+                              <a:srgbClr val="000000"/>
+                            </a:solidFill>
+                            <a:latin typeface="Cambria Math" panose="02040503050406030204" pitchFamily="18" charset="0"/>
+                          </a:rPr>
+                          <m:t>𝑅</m:t>
+                        </m:r>
+                        <m:r>
+                          <a:rPr lang="en-US" sz="1400" b="0" i="1" smtClean="0">
+                            <a:solidFill>
+                              <a:srgbClr val="000000"/>
+                            </a:solidFill>
+                            <a:latin typeface="Cambria Math" panose="02040503050406030204" pitchFamily="18" charset="0"/>
+                          </a:rPr>
+                          <m:t>(</m:t>
+                        </m:r>
+                        <m:sSub>
+                          <m:sSubPr>
+                            <m:ctrlPr>
+                              <a:rPr lang="en-US" sz="1400" b="0" i="1" smtClean="0">
+                                <a:solidFill>
+                                  <a:srgbClr val="000000"/>
+                                </a:solidFill>
+                                <a:latin typeface="Cambria Math" panose="02040503050406030204" pitchFamily="18" charset="0"/>
+                              </a:rPr>
+                            </m:ctrlPr>
+                          </m:sSubPr>
+                          <m:e>
+                            <m:r>
+                              <a:rPr lang="en-US" sz="1400" b="0" i="1" smtClean="0">
+                                <a:solidFill>
+                                  <a:srgbClr val="000000"/>
+                                </a:solidFill>
+                                <a:latin typeface="Cambria Math" panose="02040503050406030204" pitchFamily="18" charset="0"/>
+                              </a:rPr>
+                              <m:t>𝑎</m:t>
+                            </m:r>
+                          </m:e>
+                          <m:sub>
+                            <m:r>
+                              <a:rPr lang="en-US" sz="1400" b="0" i="1" smtClean="0">
+                                <a:solidFill>
+                                  <a:srgbClr val="000000"/>
+                                </a:solidFill>
+                                <a:latin typeface="Cambria Math" panose="02040503050406030204" pitchFamily="18" charset="0"/>
+                              </a:rPr>
+                              <m:t>𝑘</m:t>
+                            </m:r>
+                          </m:sub>
+                        </m:sSub>
+                        <m:r>
+                          <a:rPr lang="en-US" sz="1400" b="0" i="1" smtClean="0">
+                            <a:solidFill>
+                              <a:srgbClr val="000000"/>
+                            </a:solidFill>
+                            <a:latin typeface="Cambria Math" panose="02040503050406030204" pitchFamily="18" charset="0"/>
+                          </a:rPr>
+                          <m:t>)</m:t>
+                        </m:r>
+                      </m:e>
+                    </m:nary>
+                  </m:oMath>
+                </a14:m>
+                <a:r>
+                  <a:rPr lang="en-US" sz="1400" dirty="0">
+                    <a:solidFill>
+                      <a:srgbClr val="000000"/>
+                    </a:solidFill>
+                    <a:latin typeface="Helvetica Neue" panose="02000503000000020004" pitchFamily="2" charset="0"/>
+                  </a:rPr>
+                  <a:t>,    </a:t>
+                </a:r>
+                <a14:m>
+                  <m:oMath xmlns:m="http://schemas.openxmlformats.org/officeDocument/2006/math">
+                    <m:sSub>
+                      <m:sSubPr>
+                        <m:ctrlPr>
+                          <a:rPr lang="en-US" sz="1400" b="0" i="1" smtClean="0">
+                            <a:solidFill>
+                              <a:srgbClr val="000000"/>
+                            </a:solidFill>
+                            <a:latin typeface="Cambria Math" panose="02040503050406030204" pitchFamily="18" charset="0"/>
+                          </a:rPr>
+                        </m:ctrlPr>
+                      </m:sSubPr>
+                      <m:e>
+                        <m:r>
+                          <a:rPr lang="en-US" sz="1400" b="0" i="1" smtClean="0">
+                            <a:solidFill>
+                              <a:srgbClr val="000000"/>
+                            </a:solidFill>
+                            <a:latin typeface="Cambria Math" panose="02040503050406030204" pitchFamily="18" charset="0"/>
+                          </a:rPr>
+                          <m:t>𝑎</m:t>
+                        </m:r>
+                      </m:e>
+                      <m:sub>
+                        <m:r>
+                          <a:rPr lang="en-US" sz="1400" b="0" i="1" smtClean="0">
+                            <a:solidFill>
+                              <a:srgbClr val="000000"/>
+                            </a:solidFill>
+                            <a:latin typeface="Cambria Math" panose="02040503050406030204" pitchFamily="18" charset="0"/>
+                          </a:rPr>
+                          <m:t>𝑘</m:t>
+                        </m:r>
+                      </m:sub>
+                    </m:sSub>
+                    <m:r>
+                      <a:rPr lang="en-US" sz="1400" b="0" i="1" smtClean="0">
+                        <a:solidFill>
+                          <a:srgbClr val="000000"/>
+                        </a:solidFill>
+                        <a:latin typeface="Cambria Math" panose="02040503050406030204" pitchFamily="18" charset="0"/>
+                        <a:ea typeface="Cambria Math" panose="02040503050406030204" pitchFamily="18" charset="0"/>
+                      </a:rPr>
+                      <m:t>~</m:t>
+                    </m:r>
+                    <m:sSup>
+                      <m:sSupPr>
+                        <m:ctrlPr>
+                          <a:rPr lang="en-US" sz="1400" b="0" i="1" smtClean="0">
+                            <a:solidFill>
+                              <a:srgbClr val="000000"/>
+                            </a:solidFill>
+                            <a:latin typeface="Cambria Math" panose="02040503050406030204" pitchFamily="18" charset="0"/>
+                            <a:ea typeface="Cambria Math" panose="02040503050406030204" pitchFamily="18" charset="0"/>
+                          </a:rPr>
+                        </m:ctrlPr>
+                      </m:sSupPr>
+                      <m:e>
+                        <m:r>
+                          <a:rPr lang="en-US" sz="1400" b="0" i="1" smtClean="0">
+                            <a:solidFill>
+                              <a:srgbClr val="000000"/>
+                            </a:solidFill>
+                            <a:latin typeface="Cambria Math" panose="02040503050406030204" pitchFamily="18" charset="0"/>
+                            <a:ea typeface="Cambria Math" panose="02040503050406030204" pitchFamily="18" charset="0"/>
+                          </a:rPr>
+                          <m:t>𝜋</m:t>
+                        </m:r>
+                      </m:e>
+                      <m:sup>
+                        <m:r>
+                          <a:rPr lang="en-US" sz="1400" b="0" i="1" smtClean="0">
+                            <a:solidFill>
+                              <a:srgbClr val="000000"/>
+                            </a:solidFill>
+                            <a:latin typeface="Cambria Math" panose="02040503050406030204" pitchFamily="18" charset="0"/>
+                            <a:ea typeface="Cambria Math" panose="02040503050406030204" pitchFamily="18" charset="0"/>
+                          </a:rPr>
+                          <m:t>𝜂</m:t>
+                        </m:r>
+                      </m:sup>
+                    </m:sSup>
+                    <m:r>
+                      <a:rPr lang="en-US" sz="1400" b="0" i="1" smtClean="0">
+                        <a:solidFill>
+                          <a:srgbClr val="000000"/>
+                        </a:solidFill>
+                        <a:latin typeface="Cambria Math" panose="02040503050406030204" pitchFamily="18" charset="0"/>
+                        <a:ea typeface="Cambria Math" panose="02040503050406030204" pitchFamily="18" charset="0"/>
+                      </a:rPr>
+                      <m:t>(∙)</m:t>
+                    </m:r>
+                  </m:oMath>
+                </a14:m>
+                <a:endParaRPr lang="en-US" sz="1400" dirty="0">
+                  <a:solidFill>
+                    <a:srgbClr val="000000"/>
+                  </a:solidFill>
+                  <a:latin typeface="Helvetica Neue" panose="02000503000000020004" pitchFamily="2" charset="0"/>
+                </a:endParaRPr>
+              </a:p>
             </p:txBody>
           </p:sp>
         </mc:Choice>
-        <mc:Fallback xmlns="">
+        <mc:Fallback>
           <p:sp>
             <p:nvSpPr>
               <p:cNvPr id="7" name="Google Shape;311;p57">
@@ -19950,7 +20236,7 @@
             <p:spPr>
               <a:xfrm>
                 <a:off x="122850" y="1032459"/>
-                <a:ext cx="8801144" cy="3478172"/>
+                <a:ext cx="8801144" cy="3656142"/>
               </a:xfrm>
               <a:prstGeom prst="rect">
                 <a:avLst/>
@@ -19958,7 +20244,7 @@
               <a:blipFill>
                 <a:blip r:embed="rId3"/>
                 <a:stretch>
-                  <a:fillRect r="-288" b="-24727"/>
+                  <a:fillRect b="-18685"/>
                 </a:stretch>
               </a:blipFill>
             </p:spPr>
@@ -20045,8 +20331,8 @@
           </a:p>
         </p:txBody>
       </p:sp>
-      <mc:AlternateContent xmlns:mc="http://schemas.openxmlformats.org/markup-compatibility/2006" xmlns:a14="http://schemas.microsoft.com/office/drawing/2010/main">
-        <mc:Choice Requires="a14">
+      <mc:AlternateContent xmlns:mc="http://schemas.openxmlformats.org/markup-compatibility/2006">
+        <mc:Choice xmlns:a14="http://schemas.microsoft.com/office/drawing/2010/main" Requires="a14">
           <p:sp>
             <p:nvSpPr>
               <p:cNvPr id="7" name="Google Shape;311;p57">
@@ -20065,8 +20351,8 @@
             </p:nvSpPr>
             <p:spPr>
               <a:xfrm>
-                <a:off x="122850" y="1032459"/>
-                <a:ext cx="8801144" cy="3478172"/>
+                <a:off x="122850" y="877580"/>
+                <a:ext cx="8801144" cy="4031950"/>
               </a:xfrm>
               <a:prstGeom prst="rect">
                 <a:avLst/>
@@ -21108,6 +21394,43 @@
                         </m:ctrlPr>
                       </m:sSupPr>
                       <m:e>
+                        <m:sSub>
+                          <m:sSubPr>
+                            <m:ctrlPr>
+                              <a:rPr lang="en-US" sz="1400" b="0" i="1" smtClean="0">
+                                <a:solidFill>
+                                  <a:srgbClr val="C00000"/>
+                                </a:solidFill>
+                                <a:latin typeface="Cambria Math" panose="02040503050406030204" pitchFamily="18" charset="0"/>
+                              </a:rPr>
+                            </m:ctrlPr>
+                          </m:sSubPr>
+                          <m:e>
+                            <m:r>
+                              <m:rPr>
+                                <m:sty m:val="p"/>
+                              </m:rPr>
+                              <a:rPr lang="en-US" sz="1400" b="0" i="0" smtClean="0">
+                                <a:solidFill>
+                                  <a:srgbClr val="C00000"/>
+                                </a:solidFill>
+                                <a:latin typeface="Cambria Math" panose="02040503050406030204" pitchFamily="18" charset="0"/>
+                              </a:rPr>
+                              <m:t>∇</m:t>
+                            </m:r>
+                          </m:e>
+                          <m:sub>
+                            <m:r>
+                              <a:rPr lang="en-US" sz="1400" b="0" i="1" smtClean="0">
+                                <a:solidFill>
+                                  <a:srgbClr val="C00000"/>
+                                </a:solidFill>
+                                <a:latin typeface="Cambria Math" panose="02040503050406030204" pitchFamily="18" charset="0"/>
+                              </a:rPr>
+                              <m:t>𝜂</m:t>
+                            </m:r>
+                          </m:sub>
+                        </m:sSub>
                         <m:r>
                           <a:rPr lang="en-US" sz="1400" b="0" i="1" smtClean="0">
                             <a:solidFill>
@@ -21203,10 +21526,225 @@
                   <a:latin typeface="Helvetica Neue" panose="02000503000000020004" pitchFamily="2" charset="0"/>
                 </a:endParaRPr>
               </a:p>
+              <a:p>
+                <a:pPr marL="133350" indent="0" algn="ctr">
+                  <a:buNone/>
+                </a:pPr>
+                <a14:m>
+                  <m:oMathPara xmlns:m="http://schemas.openxmlformats.org/officeDocument/2006/math">
+                    <m:oMathParaPr>
+                      <m:jc m:val="centerGroup"/>
+                    </m:oMathParaPr>
+                    <m:oMath xmlns:m="http://schemas.openxmlformats.org/officeDocument/2006/math">
+                      <m:sSub>
+                        <m:sSubPr>
+                          <m:ctrlPr>
+                            <a:rPr lang="en-US" sz="1400" i="1">
+                              <a:solidFill>
+                                <a:srgbClr val="000000"/>
+                              </a:solidFill>
+                              <a:latin typeface="Cambria Math" panose="02040503050406030204" pitchFamily="18" charset="0"/>
+                            </a:rPr>
+                          </m:ctrlPr>
+                        </m:sSubPr>
+                        <m:e>
+                          <m:r>
+                            <m:rPr>
+                              <m:sty m:val="p"/>
+                            </m:rPr>
+                            <a:rPr lang="en-US" sz="1400">
+                              <a:solidFill>
+                                <a:srgbClr val="000000"/>
+                              </a:solidFill>
+                              <a:latin typeface="Cambria Math" panose="02040503050406030204" pitchFamily="18" charset="0"/>
+                            </a:rPr>
+                            <m:t>∇</m:t>
+                          </m:r>
+                        </m:e>
+                        <m:sub>
+                          <m:r>
+                            <a:rPr lang="en-US" sz="1400" i="1">
+                              <a:solidFill>
+                                <a:srgbClr val="000000"/>
+                              </a:solidFill>
+                              <a:latin typeface="Cambria Math" panose="02040503050406030204" pitchFamily="18" charset="0"/>
+                            </a:rPr>
+                            <m:t>𝜂</m:t>
+                          </m:r>
+                        </m:sub>
+                      </m:sSub>
+                      <m:r>
+                        <a:rPr lang="en-US" sz="1400" i="1">
+                          <a:solidFill>
+                            <a:srgbClr val="000000"/>
+                          </a:solidFill>
+                          <a:latin typeface="Cambria Math" panose="02040503050406030204" pitchFamily="18" charset="0"/>
+                        </a:rPr>
+                        <m:t>𝐽</m:t>
+                      </m:r>
+                      <m:d>
+                        <m:dPr>
+                          <m:ctrlPr>
+                            <a:rPr lang="en-US" sz="1400" i="1">
+                              <a:solidFill>
+                                <a:srgbClr val="000000"/>
+                              </a:solidFill>
+                              <a:latin typeface="Cambria Math" panose="02040503050406030204" pitchFamily="18" charset="0"/>
+                            </a:rPr>
+                          </m:ctrlPr>
+                        </m:dPr>
+                        <m:e>
+                          <m:r>
+                            <a:rPr lang="en-US" sz="1400" i="1">
+                              <a:solidFill>
+                                <a:srgbClr val="000000"/>
+                              </a:solidFill>
+                              <a:latin typeface="Cambria Math" panose="02040503050406030204" pitchFamily="18" charset="0"/>
+                            </a:rPr>
+                            <m:t>𝜂</m:t>
+                          </m:r>
+                        </m:e>
+                      </m:d>
+                      <m:r>
+                        <a:rPr lang="en-US" sz="1400" i="1" smtClean="0">
+                          <a:solidFill>
+                            <a:srgbClr val="000000"/>
+                          </a:solidFill>
+                          <a:latin typeface="Cambria Math" panose="02040503050406030204" pitchFamily="18" charset="0"/>
+                          <a:ea typeface="Cambria Math" panose="02040503050406030204" pitchFamily="18" charset="0"/>
+                        </a:rPr>
+                        <m:t>≈</m:t>
+                      </m:r>
+                      <m:f>
+                        <m:fPr>
+                          <m:ctrlPr>
+                            <a:rPr lang="en-US" sz="1400" b="0" i="1" smtClean="0">
+                              <a:solidFill>
+                                <a:srgbClr val="000000"/>
+                              </a:solidFill>
+                              <a:latin typeface="Cambria Math" panose="02040503050406030204" pitchFamily="18" charset="0"/>
+                            </a:rPr>
+                          </m:ctrlPr>
+                        </m:fPr>
+                        <m:num>
+                          <m:r>
+                            <a:rPr lang="en-US" sz="1400" b="0" i="1" smtClean="0">
+                              <a:solidFill>
+                                <a:srgbClr val="000000"/>
+                              </a:solidFill>
+                              <a:latin typeface="Cambria Math" panose="02040503050406030204" pitchFamily="18" charset="0"/>
+                            </a:rPr>
+                            <m:t>𝐽</m:t>
+                          </m:r>
+                          <m:d>
+                            <m:dPr>
+                              <m:ctrlPr>
+                                <a:rPr lang="en-US" sz="1400" b="0" i="1" smtClean="0">
+                                  <a:solidFill>
+                                    <a:srgbClr val="000000"/>
+                                  </a:solidFill>
+                                  <a:latin typeface="Cambria Math" panose="02040503050406030204" pitchFamily="18" charset="0"/>
+                                </a:rPr>
+                              </m:ctrlPr>
+                            </m:dPr>
+                            <m:e>
+                              <m:r>
+                                <a:rPr lang="en-US" sz="1400" b="0" i="1" smtClean="0">
+                                  <a:solidFill>
+                                    <a:srgbClr val="000000"/>
+                                  </a:solidFill>
+                                  <a:latin typeface="Cambria Math" panose="02040503050406030204" pitchFamily="18" charset="0"/>
+                                </a:rPr>
+                                <m:t>𝜂</m:t>
+                              </m:r>
+                              <m:r>
+                                <a:rPr lang="en-US" sz="1400" b="0" i="1" smtClean="0">
+                                  <a:solidFill>
+                                    <a:srgbClr val="000000"/>
+                                  </a:solidFill>
+                                  <a:latin typeface="Cambria Math" panose="02040503050406030204" pitchFamily="18" charset="0"/>
+                                </a:rPr>
+                                <m:t>+</m:t>
+                              </m:r>
+                              <m:r>
+                                <a:rPr lang="en-US" sz="1400" b="0" i="1" smtClean="0">
+                                  <a:solidFill>
+                                    <a:srgbClr val="000000"/>
+                                  </a:solidFill>
+                                  <a:latin typeface="Cambria Math" panose="02040503050406030204" pitchFamily="18" charset="0"/>
+                                </a:rPr>
+                                <m:t>𝛿</m:t>
+                              </m:r>
+                            </m:e>
+                          </m:d>
+                          <m:r>
+                            <a:rPr lang="en-US" sz="1400" b="0" i="1" smtClean="0">
+                              <a:solidFill>
+                                <a:srgbClr val="000000"/>
+                              </a:solidFill>
+                              <a:latin typeface="Cambria Math" panose="02040503050406030204" pitchFamily="18" charset="0"/>
+                            </a:rPr>
+                            <m:t>−</m:t>
+                          </m:r>
+                          <m:r>
+                            <a:rPr lang="en-US" sz="1400" b="0" i="1" smtClean="0">
+                              <a:solidFill>
+                                <a:srgbClr val="000000"/>
+                              </a:solidFill>
+                              <a:latin typeface="Cambria Math" panose="02040503050406030204" pitchFamily="18" charset="0"/>
+                            </a:rPr>
+                            <m:t>𝐽</m:t>
+                          </m:r>
+                          <m:d>
+                            <m:dPr>
+                              <m:ctrlPr>
+                                <a:rPr lang="en-US" sz="1400" b="0" i="1" smtClean="0">
+                                  <a:solidFill>
+                                    <a:srgbClr val="000000"/>
+                                  </a:solidFill>
+                                  <a:latin typeface="Cambria Math" panose="02040503050406030204" pitchFamily="18" charset="0"/>
+                                </a:rPr>
+                              </m:ctrlPr>
+                            </m:dPr>
+                            <m:e>
+                              <m:r>
+                                <a:rPr lang="en-US" sz="1400" b="0" i="1" smtClean="0">
+                                  <a:solidFill>
+                                    <a:srgbClr val="000000"/>
+                                  </a:solidFill>
+                                  <a:latin typeface="Cambria Math" panose="02040503050406030204" pitchFamily="18" charset="0"/>
+                                </a:rPr>
+                                <m:t>𝜂</m:t>
+                              </m:r>
+                            </m:e>
+                          </m:d>
+                        </m:num>
+                        <m:den>
+                          <m:r>
+                            <a:rPr lang="en-US" sz="1400" b="0" i="1" smtClean="0">
+                              <a:solidFill>
+                                <a:srgbClr val="000000"/>
+                              </a:solidFill>
+                              <a:latin typeface="Cambria Math" panose="02040503050406030204" pitchFamily="18" charset="0"/>
+                            </a:rPr>
+                            <m:t>𝛿</m:t>
+                          </m:r>
+                        </m:den>
+                      </m:f>
+                    </m:oMath>
+                  </m:oMathPara>
+                </a14:m>
+                <a:endParaRPr lang="en-US" sz="1400" dirty="0">
+                  <a:solidFill>
+                    <a:srgbClr val="000000"/>
+                  </a:solidFill>
+                  <a:latin typeface="Helvetica Neue" panose="02000503000000020004" pitchFamily="2" charset="0"/>
+                </a:endParaRPr>
+              </a:p>
             </p:txBody>
           </p:sp>
         </mc:Choice>
-        <mc:Fallback xmlns="">
+        <mc:Fallback>
           <p:sp>
             <p:nvSpPr>
               <p:cNvPr id="7" name="Google Shape;311;p57">
@@ -21225,8 +21763,8 @@
             </p:nvSpPr>
             <p:spPr>
               <a:xfrm>
-                <a:off x="122850" y="1032459"/>
-                <a:ext cx="8801144" cy="3478172"/>
+                <a:off x="122850" y="877580"/>
+                <a:ext cx="8801144" cy="4031950"/>
               </a:xfrm>
               <a:prstGeom prst="rect">
                 <a:avLst/>
@@ -21234,7 +21772,7 @@
               <a:blipFill>
                 <a:blip r:embed="rId3"/>
                 <a:stretch>
-                  <a:fillRect t="-16000" b="-1091"/>
+                  <a:fillRect t="-14151"/>
                 </a:stretch>
               </a:blipFill>
             </p:spPr>
@@ -21375,17 +21913,6 @@
                 <a:pPr marL="133350" indent="0">
                   <a:buNone/>
                 </a:pPr>
-                <a:endParaRPr lang="ru-RU" sz="1600" dirty="0">
-                  <a:solidFill>
-                    <a:srgbClr val="000000"/>
-                  </a:solidFill>
-                  <a:latin typeface="Helvetica Neue" panose="02000503000000020004" pitchFamily="2" charset="0"/>
-                </a:endParaRPr>
-              </a:p>
-              <a:p>
-                <a:pPr marL="133350" indent="0">
-                  <a:buNone/>
-                </a:pPr>
                 <a:r>
                   <a:rPr lang="ru-RU" sz="1600" dirty="0">
                     <a:solidFill>
@@ -21393,228 +21920,8 @@
                     </a:solidFill>
                     <a:latin typeface="Helvetica Neue" panose="02000503000000020004" pitchFamily="2" charset="0"/>
                   </a:rPr>
-                  <a:t>Введем обозначение: </a:t>
+                  <a:t>Градиент политики можно приблизить выражением:</a:t>
                 </a:r>
-                <a14:m>
-                  <m:oMath xmlns:m="http://schemas.openxmlformats.org/officeDocument/2006/math">
-                    <m:sSub>
-                      <m:sSubPr>
-                        <m:ctrlPr>
-                          <a:rPr lang="en-US" sz="1600" b="0" i="1" smtClean="0">
-                            <a:solidFill>
-                              <a:srgbClr val="000000"/>
-                            </a:solidFill>
-                            <a:latin typeface="Cambria Math" panose="02040503050406030204" pitchFamily="18" charset="0"/>
-                          </a:rPr>
-                        </m:ctrlPr>
-                      </m:sSubPr>
-                      <m:e>
-                        <m:r>
-                          <a:rPr lang="en-US" sz="1600" b="0" i="1" smtClean="0">
-                            <a:solidFill>
-                              <a:srgbClr val="000000"/>
-                            </a:solidFill>
-                            <a:latin typeface="Cambria Math" panose="02040503050406030204" pitchFamily="18" charset="0"/>
-                          </a:rPr>
-                          <m:t>𝜌</m:t>
-                        </m:r>
-                      </m:e>
-                      <m:sub>
-                        <m:r>
-                          <a:rPr lang="en-US" sz="1600" b="0" i="1" smtClean="0">
-                            <a:solidFill>
-                              <a:srgbClr val="000000"/>
-                            </a:solidFill>
-                            <a:latin typeface="Cambria Math" panose="02040503050406030204" pitchFamily="18" charset="0"/>
-                          </a:rPr>
-                          <m:t>𝜋</m:t>
-                        </m:r>
-                      </m:sub>
-                    </m:sSub>
-                    <m:d>
-                      <m:dPr>
-                        <m:ctrlPr>
-                          <a:rPr lang="en-US" sz="1600" b="0" i="1" smtClean="0">
-                            <a:solidFill>
-                              <a:srgbClr val="000000"/>
-                            </a:solidFill>
-                            <a:latin typeface="Cambria Math" panose="02040503050406030204" pitchFamily="18" charset="0"/>
-                          </a:rPr>
-                        </m:ctrlPr>
-                      </m:dPr>
-                      <m:e>
-                        <m:r>
-                          <a:rPr lang="en-US" sz="1600" b="0" i="1" smtClean="0">
-                            <a:solidFill>
-                              <a:srgbClr val="000000"/>
-                            </a:solidFill>
-                            <a:latin typeface="Cambria Math" panose="02040503050406030204" pitchFamily="18" charset="0"/>
-                          </a:rPr>
-                          <m:t>𝑠</m:t>
-                        </m:r>
-                      </m:e>
-                    </m:d>
-                    <m:r>
-                      <a:rPr lang="en-US" sz="1600" b="0" i="1" smtClean="0">
-                        <a:solidFill>
-                          <a:srgbClr val="000000"/>
-                        </a:solidFill>
-                        <a:latin typeface="Cambria Math" panose="02040503050406030204" pitchFamily="18" charset="0"/>
-                      </a:rPr>
-                      <m:t>= </m:t>
-                    </m:r>
-                    <m:nary>
-                      <m:naryPr>
-                        <m:chr m:val="∑"/>
-                        <m:ctrlPr>
-                          <a:rPr lang="en-US" sz="1600" b="0" i="1" smtClean="0">
-                            <a:solidFill>
-                              <a:srgbClr val="000000"/>
-                            </a:solidFill>
-                            <a:latin typeface="Cambria Math" panose="02040503050406030204" pitchFamily="18" charset="0"/>
-                          </a:rPr>
-                        </m:ctrlPr>
-                      </m:naryPr>
-                      <m:sub>
-                        <m:r>
-                          <m:rPr>
-                            <m:brk m:alnAt="23"/>
-                          </m:rPr>
-                          <a:rPr lang="en-US" sz="1600" b="0" i="1" smtClean="0">
-                            <a:solidFill>
-                              <a:srgbClr val="000000"/>
-                            </a:solidFill>
-                            <a:latin typeface="Cambria Math" panose="02040503050406030204" pitchFamily="18" charset="0"/>
-                          </a:rPr>
-                          <m:t>𝑡</m:t>
-                        </m:r>
-                        <m:r>
-                          <a:rPr lang="en-US" sz="1600" b="0" i="1" smtClean="0">
-                            <a:solidFill>
-                              <a:srgbClr val="000000"/>
-                            </a:solidFill>
-                            <a:latin typeface="Cambria Math" panose="02040503050406030204" pitchFamily="18" charset="0"/>
-                          </a:rPr>
-                          <m:t>=0</m:t>
-                        </m:r>
-                      </m:sub>
-                      <m:sup>
-                        <m:r>
-                          <a:rPr lang="en-US" sz="1600" b="0" i="1" smtClean="0">
-                            <a:solidFill>
-                              <a:srgbClr val="000000"/>
-                            </a:solidFill>
-                            <a:latin typeface="Cambria Math" panose="02040503050406030204" pitchFamily="18" charset="0"/>
-                          </a:rPr>
-                          <m:t>∞</m:t>
-                        </m:r>
-                      </m:sup>
-                      <m:e>
-                        <m:sSup>
-                          <m:sSupPr>
-                            <m:ctrlPr>
-                              <a:rPr lang="en-US" sz="1600" b="0" i="1" smtClean="0">
-                                <a:solidFill>
-                                  <a:srgbClr val="000000"/>
-                                </a:solidFill>
-                                <a:latin typeface="Cambria Math" panose="02040503050406030204" pitchFamily="18" charset="0"/>
-                              </a:rPr>
-                            </m:ctrlPr>
-                          </m:sSupPr>
-                          <m:e>
-                            <m:r>
-                              <a:rPr lang="en-US" sz="1600" b="0" i="1" smtClean="0">
-                                <a:solidFill>
-                                  <a:srgbClr val="000000"/>
-                                </a:solidFill>
-                                <a:latin typeface="Cambria Math" panose="02040503050406030204" pitchFamily="18" charset="0"/>
-                              </a:rPr>
-                              <m:t>𝛾</m:t>
-                            </m:r>
-                          </m:e>
-                          <m:sup>
-                            <m:r>
-                              <a:rPr lang="en-US" sz="1600" b="0" i="1" smtClean="0">
-                                <a:solidFill>
-                                  <a:srgbClr val="000000"/>
-                                </a:solidFill>
-                                <a:latin typeface="Cambria Math" panose="02040503050406030204" pitchFamily="18" charset="0"/>
-                              </a:rPr>
-                              <m:t>𝑡</m:t>
-                            </m:r>
-                          </m:sup>
-                        </m:sSup>
-                        <m:r>
-                          <a:rPr lang="en-US" sz="1600" b="0" i="1" smtClean="0">
-                            <a:solidFill>
-                              <a:srgbClr val="000000"/>
-                            </a:solidFill>
-                            <a:latin typeface="Cambria Math" panose="02040503050406030204" pitchFamily="18" charset="0"/>
-                          </a:rPr>
-                          <m:t>ℙ</m:t>
-                        </m:r>
-                        <m:d>
-                          <m:dPr>
-                            <m:ctrlPr>
-                              <a:rPr lang="en-US" sz="1600" b="0" i="1" smtClean="0">
-                                <a:solidFill>
-                                  <a:srgbClr val="000000"/>
-                                </a:solidFill>
-                                <a:latin typeface="Cambria Math" panose="02040503050406030204" pitchFamily="18" charset="0"/>
-                              </a:rPr>
-                            </m:ctrlPr>
-                          </m:dPr>
-                          <m:e>
-                            <m:r>
-                              <a:rPr lang="en-US" sz="1600" b="0" i="1" smtClean="0">
-                                <a:solidFill>
-                                  <a:srgbClr val="000000"/>
-                                </a:solidFill>
-                                <a:latin typeface="Cambria Math" panose="02040503050406030204" pitchFamily="18" charset="0"/>
-                              </a:rPr>
-                              <m:t>𝑠</m:t>
-                            </m:r>
-                          </m:e>
-                          <m:e>
-                            <m:r>
-                              <a:rPr lang="en-US" sz="1600" b="0" i="1" smtClean="0">
-                                <a:solidFill>
-                                  <a:srgbClr val="000000"/>
-                                </a:solidFill>
-                                <a:latin typeface="Cambria Math" panose="02040503050406030204" pitchFamily="18" charset="0"/>
-                              </a:rPr>
-                              <m:t>𝜋</m:t>
-                            </m:r>
-                          </m:e>
-                        </m:d>
-                      </m:e>
-                    </m:nary>
-                    <m:r>
-                      <a:rPr lang="en-US" sz="1600" b="0" i="1" smtClean="0">
-                        <a:solidFill>
-                          <a:srgbClr val="000000"/>
-                        </a:solidFill>
-                        <a:latin typeface="Cambria Math" panose="02040503050406030204" pitchFamily="18" charset="0"/>
-                      </a:rPr>
-                      <m:t> </m:t>
-                    </m:r>
-                  </m:oMath>
-                </a14:m>
-                <a:r>
-                  <a:rPr lang="en-US" sz="1600" dirty="0">
-                    <a:solidFill>
-                      <a:srgbClr val="000000"/>
-                    </a:solidFill>
-                    <a:latin typeface="Helvetica Neue" panose="02000503000000020004" pitchFamily="2" charset="0"/>
-                  </a:rPr>
-                  <a:t>.</a:t>
-                </a:r>
-                <a:endParaRPr lang="ru-RU" sz="1600" dirty="0">
-                  <a:solidFill>
-                    <a:srgbClr val="000000"/>
-                  </a:solidFill>
-                  <a:latin typeface="Helvetica Neue" panose="02000503000000020004" pitchFamily="2" charset="0"/>
-                </a:endParaRPr>
               </a:p>
               <a:p>
                 <a:pPr marL="133350" indent="0">
@@ -22402,6 +22709,251 @@
                 </a:endParaRPr>
               </a:p>
               <a:p>
+                <a:pPr marL="133350" indent="0">
+                  <a:buNone/>
+                </a:pPr>
+                <a:endParaRPr lang="ru-RU" sz="1600" dirty="0">
+                  <a:solidFill>
+                    <a:srgbClr val="000000"/>
+                  </a:solidFill>
+                  <a:latin typeface="Helvetica Neue" panose="02000503000000020004" pitchFamily="2" charset="0"/>
+                </a:endParaRPr>
+              </a:p>
+              <a:p>
+                <a:pPr marL="133350" indent="0">
+                  <a:buNone/>
+                </a:pPr>
+                <a:r>
+                  <a:rPr lang="ru-RU" sz="1600" dirty="0">
+                    <a:solidFill>
+                      <a:srgbClr val="000000"/>
+                    </a:solidFill>
+                    <a:latin typeface="Helvetica Neue" panose="02000503000000020004" pitchFamily="2" charset="0"/>
+                  </a:rPr>
+                  <a:t>где </a:t>
+                </a:r>
+                <a14:m>
+                  <m:oMath xmlns:m="http://schemas.openxmlformats.org/officeDocument/2006/math">
+                    <m:sSub>
+                      <m:sSubPr>
+                        <m:ctrlPr>
+                          <a:rPr lang="en-US" sz="1600" b="0" i="1" smtClean="0">
+                            <a:solidFill>
+                              <a:srgbClr val="000000"/>
+                            </a:solidFill>
+                            <a:latin typeface="Cambria Math" panose="02040503050406030204" pitchFamily="18" charset="0"/>
+                          </a:rPr>
+                        </m:ctrlPr>
+                      </m:sSubPr>
+                      <m:e>
+                        <m:r>
+                          <a:rPr lang="en-US" sz="1600" b="0" i="1" smtClean="0">
+                            <a:solidFill>
+                              <a:srgbClr val="000000"/>
+                            </a:solidFill>
+                            <a:latin typeface="Cambria Math" panose="02040503050406030204" pitchFamily="18" charset="0"/>
+                          </a:rPr>
+                          <m:t>𝜌</m:t>
+                        </m:r>
+                      </m:e>
+                      <m:sub>
+                        <m:r>
+                          <a:rPr lang="en-US" sz="1600" b="0" i="1" smtClean="0">
+                            <a:solidFill>
+                              <a:srgbClr val="000000"/>
+                            </a:solidFill>
+                            <a:latin typeface="Cambria Math" panose="02040503050406030204" pitchFamily="18" charset="0"/>
+                          </a:rPr>
+                          <m:t>𝜋</m:t>
+                        </m:r>
+                      </m:sub>
+                    </m:sSub>
+                    <m:d>
+                      <m:dPr>
+                        <m:ctrlPr>
+                          <a:rPr lang="en-US" sz="1600" b="0" i="1" smtClean="0">
+                            <a:solidFill>
+                              <a:srgbClr val="000000"/>
+                            </a:solidFill>
+                            <a:latin typeface="Cambria Math" panose="02040503050406030204" pitchFamily="18" charset="0"/>
+                          </a:rPr>
+                        </m:ctrlPr>
+                      </m:dPr>
+                      <m:e>
+                        <m:r>
+                          <a:rPr lang="en-US" sz="1600" b="0" i="1" smtClean="0">
+                            <a:solidFill>
+                              <a:srgbClr val="000000"/>
+                            </a:solidFill>
+                            <a:latin typeface="Cambria Math" panose="02040503050406030204" pitchFamily="18" charset="0"/>
+                          </a:rPr>
+                          <m:t>𝑠</m:t>
+                        </m:r>
+                      </m:e>
+                    </m:d>
+                    <m:r>
+                      <a:rPr lang="en-US" sz="1600" b="0" i="1" smtClean="0">
+                        <a:solidFill>
+                          <a:srgbClr val="000000"/>
+                        </a:solidFill>
+                        <a:latin typeface="Cambria Math" panose="02040503050406030204" pitchFamily="18" charset="0"/>
+                      </a:rPr>
+                      <m:t>= </m:t>
+                    </m:r>
+                    <m:nary>
+                      <m:naryPr>
+                        <m:chr m:val="∑"/>
+                        <m:ctrlPr>
+                          <a:rPr lang="en-US" sz="1600" b="0" i="1" smtClean="0">
+                            <a:solidFill>
+                              <a:srgbClr val="000000"/>
+                            </a:solidFill>
+                            <a:latin typeface="Cambria Math" panose="02040503050406030204" pitchFamily="18" charset="0"/>
+                          </a:rPr>
+                        </m:ctrlPr>
+                      </m:naryPr>
+                      <m:sub>
+                        <m:r>
+                          <m:rPr>
+                            <m:brk m:alnAt="23"/>
+                          </m:rPr>
+                          <a:rPr lang="en-US" sz="1600" b="0" i="1" smtClean="0">
+                            <a:solidFill>
+                              <a:srgbClr val="000000"/>
+                            </a:solidFill>
+                            <a:latin typeface="Cambria Math" panose="02040503050406030204" pitchFamily="18" charset="0"/>
+                          </a:rPr>
+                          <m:t>𝑡</m:t>
+                        </m:r>
+                        <m:r>
+                          <a:rPr lang="en-US" sz="1600" b="0" i="1" smtClean="0">
+                            <a:solidFill>
+                              <a:srgbClr val="000000"/>
+                            </a:solidFill>
+                            <a:latin typeface="Cambria Math" panose="02040503050406030204" pitchFamily="18" charset="0"/>
+                          </a:rPr>
+                          <m:t>=0</m:t>
+                        </m:r>
+                      </m:sub>
+                      <m:sup>
+                        <m:r>
+                          <a:rPr lang="en-US" sz="1600" b="0" i="1" smtClean="0">
+                            <a:solidFill>
+                              <a:srgbClr val="000000"/>
+                            </a:solidFill>
+                            <a:latin typeface="Cambria Math" panose="02040503050406030204" pitchFamily="18" charset="0"/>
+                          </a:rPr>
+                          <m:t>∞</m:t>
+                        </m:r>
+                      </m:sup>
+                      <m:e>
+                        <m:sSup>
+                          <m:sSupPr>
+                            <m:ctrlPr>
+                              <a:rPr lang="en-US" sz="1600" b="0" i="1" smtClean="0">
+                                <a:solidFill>
+                                  <a:srgbClr val="000000"/>
+                                </a:solidFill>
+                                <a:latin typeface="Cambria Math" panose="02040503050406030204" pitchFamily="18" charset="0"/>
+                              </a:rPr>
+                            </m:ctrlPr>
+                          </m:sSupPr>
+                          <m:e>
+                            <m:r>
+                              <a:rPr lang="en-US" sz="1600" b="0" i="1" smtClean="0">
+                                <a:solidFill>
+                                  <a:srgbClr val="000000"/>
+                                </a:solidFill>
+                                <a:latin typeface="Cambria Math" panose="02040503050406030204" pitchFamily="18" charset="0"/>
+                              </a:rPr>
+                              <m:t>𝛾</m:t>
+                            </m:r>
+                          </m:e>
+                          <m:sup>
+                            <m:r>
+                              <a:rPr lang="en-US" sz="1600" b="0" i="1" smtClean="0">
+                                <a:solidFill>
+                                  <a:srgbClr val="000000"/>
+                                </a:solidFill>
+                                <a:latin typeface="Cambria Math" panose="02040503050406030204" pitchFamily="18" charset="0"/>
+                              </a:rPr>
+                              <m:t>𝑡</m:t>
+                            </m:r>
+                          </m:sup>
+                        </m:sSup>
+                        <m:r>
+                          <a:rPr lang="en-US" sz="1600" b="0" i="1" smtClean="0">
+                            <a:solidFill>
+                              <a:srgbClr val="000000"/>
+                            </a:solidFill>
+                            <a:latin typeface="Cambria Math" panose="02040503050406030204" pitchFamily="18" charset="0"/>
+                          </a:rPr>
+                          <m:t>ℙ</m:t>
+                        </m:r>
+                        <m:d>
+                          <m:dPr>
+                            <m:ctrlPr>
+                              <a:rPr lang="en-US" sz="1600" b="0" i="1" smtClean="0">
+                                <a:solidFill>
+                                  <a:srgbClr val="000000"/>
+                                </a:solidFill>
+                                <a:latin typeface="Cambria Math" panose="02040503050406030204" pitchFamily="18" charset="0"/>
+                              </a:rPr>
+                            </m:ctrlPr>
+                          </m:dPr>
+                          <m:e>
+                            <m:r>
+                              <a:rPr lang="en-US" sz="1600" b="0" i="1" smtClean="0">
+                                <a:solidFill>
+                                  <a:srgbClr val="000000"/>
+                                </a:solidFill>
+                                <a:latin typeface="Cambria Math" panose="02040503050406030204" pitchFamily="18" charset="0"/>
+                              </a:rPr>
+                              <m:t>𝑠</m:t>
+                            </m:r>
+                          </m:e>
+                          <m:e>
+                            <m:r>
+                              <a:rPr lang="en-US" sz="1600" b="0" i="1" smtClean="0">
+                                <a:solidFill>
+                                  <a:srgbClr val="000000"/>
+                                </a:solidFill>
+                                <a:latin typeface="Cambria Math" panose="02040503050406030204" pitchFamily="18" charset="0"/>
+                              </a:rPr>
+                              <m:t>𝜋</m:t>
+                            </m:r>
+                          </m:e>
+                        </m:d>
+                      </m:e>
+                    </m:nary>
+                    <m:r>
+                      <a:rPr lang="en-US" sz="1600" b="0" i="1" smtClean="0">
+                        <a:solidFill>
+                          <a:srgbClr val="000000"/>
+                        </a:solidFill>
+                        <a:latin typeface="Cambria Math" panose="02040503050406030204" pitchFamily="18" charset="0"/>
+                      </a:rPr>
+                      <m:t> </m:t>
+                    </m:r>
+                  </m:oMath>
+                </a14:m>
+                <a:r>
+                  <a:rPr lang="en-US" sz="1600" dirty="0">
+                    <a:solidFill>
+                      <a:srgbClr val="000000"/>
+                    </a:solidFill>
+                    <a:latin typeface="Helvetica Neue" panose="02000503000000020004" pitchFamily="2" charset="0"/>
+                  </a:rPr>
+                  <a:t>.</a:t>
+                </a:r>
+                <a:endParaRPr lang="ru-RU" sz="1600" dirty="0">
+                  <a:solidFill>
+                    <a:srgbClr val="000000"/>
+                  </a:solidFill>
+                  <a:latin typeface="Helvetica Neue" panose="02000503000000020004" pitchFamily="2" charset="0"/>
+                </a:endParaRPr>
+              </a:p>
+              <a:p>
                 <a:pPr marL="133350" indent="0" algn="ctr">
                   <a:buNone/>
                 </a:pPr>
@@ -22764,7 +23316,7 @@
               <a:blipFill>
                 <a:blip r:embed="rId3"/>
                 <a:stretch>
-                  <a:fillRect b="-24727"/>
+                  <a:fillRect b="-34182"/>
                 </a:stretch>
               </a:blipFill>
             </p:spPr>
@@ -24264,7 +24816,7 @@
             </p:nvSpPr>
             <p:spPr>
               <a:xfrm>
-                <a:off x="122850" y="1032459"/>
+                <a:off x="122850" y="1026322"/>
                 <a:ext cx="8801144" cy="3965426"/>
               </a:xfrm>
               <a:prstGeom prst="rect">
@@ -24297,60 +24849,20 @@
                 </a:pPr>
                 <a:r>
                   <a:rPr lang="ru-RU" sz="1600" dirty="0"/>
-                  <a:t>Вводится функция ценности состояния </a:t>
+                  <a:t>Вводится функция</a:t>
                 </a:r>
-                <a14:m>
-                  <m:oMath xmlns:m="http://schemas.openxmlformats.org/officeDocument/2006/math">
-                    <m:r>
-                      <a:rPr lang="en-US" sz="1800" b="0" i="1" smtClean="0">
-                        <a:latin typeface="Cambria Math" panose="02040503050406030204" pitchFamily="18" charset="0"/>
-                      </a:rPr>
-                      <m:t>𝑉</m:t>
-                    </m:r>
-                    <m:d>
-                      <m:dPr>
-                        <m:ctrlPr>
-                          <a:rPr lang="en-US" sz="1800" b="0" i="1" smtClean="0">
-                            <a:latin typeface="Cambria Math" panose="02040503050406030204" pitchFamily="18" charset="0"/>
-                          </a:rPr>
-                        </m:ctrlPr>
-                      </m:dPr>
-                      <m:e>
-                        <m:sSub>
-                          <m:sSubPr>
-                            <m:ctrlPr>
-                              <a:rPr lang="en-US" sz="1800" b="0" i="1" smtClean="0">
-                                <a:latin typeface="Cambria Math" panose="02040503050406030204" pitchFamily="18" charset="0"/>
-                              </a:rPr>
-                            </m:ctrlPr>
-                          </m:sSubPr>
-                          <m:e>
-                            <m:r>
-                              <a:rPr lang="en-US" sz="1800" b="0" i="1" smtClean="0">
-                                <a:latin typeface="Cambria Math" panose="02040503050406030204" pitchFamily="18" charset="0"/>
-                              </a:rPr>
-                              <m:t>𝑠</m:t>
-                            </m:r>
-                          </m:e>
-                          <m:sub>
-                            <m:r>
-                              <a:rPr lang="en-US" sz="1800" b="0" i="1" smtClean="0">
-                                <a:latin typeface="Cambria Math" panose="02040503050406030204" pitchFamily="18" charset="0"/>
-                              </a:rPr>
-                              <m:t>𝑡</m:t>
-                            </m:r>
-                          </m:sub>
-                        </m:sSub>
-                      </m:e>
-                    </m:d>
-                    <m:r>
-                      <a:rPr lang="en-US" sz="1800" b="0" i="1" smtClean="0">
-                        <a:latin typeface="Cambria Math" panose="02040503050406030204" pitchFamily="18" charset="0"/>
-                      </a:rPr>
-                      <m:t>:</m:t>
-                    </m:r>
-                  </m:oMath>
-                </a14:m>
+                <a:r>
+                  <a:rPr lang="en-US" sz="1600" dirty="0"/>
+                  <a:t> </a:t>
+                </a:r>
+                <a:r>
+                  <a:rPr lang="ru-RU" sz="1600" dirty="0"/>
+                  <a:t>преимущества (</a:t>
+                </a:r>
+                <a:r>
+                  <a:rPr lang="en-US" sz="1600" dirty="0"/>
+                  <a:t>advantage function):</a:t>
+                </a:r>
                 <a:endParaRPr lang="ru-RU" sz="1800" dirty="0">
                   <a:latin typeface="PTSerif" panose="020A0603040505020204" pitchFamily="18" charset="77"/>
                 </a:endParaRPr>
@@ -24829,7 +25341,7 @@
             </p:nvSpPr>
             <p:spPr>
               <a:xfrm>
-                <a:off x="122850" y="1032459"/>
+                <a:off x="122850" y="1026322"/>
                 <a:ext cx="8801144" cy="3965426"/>
               </a:xfrm>
               <a:prstGeom prst="rect">
@@ -24838,7 +25350,7 @@
               <a:blipFill>
                 <a:blip r:embed="rId3"/>
                 <a:stretch>
-                  <a:fillRect r="-720" b="-3195"/>
+                  <a:fillRect r="-720" b="-2229"/>
                 </a:stretch>
               </a:blipFill>
             </p:spPr>
@@ -26637,40 +27149,126 @@
               <a:buAutoNum type="arabicPeriod"/>
             </a:pPr>
             <a:r>
-              <a:rPr lang="ru-RU" sz="1300" dirty="0" err="1"/>
+              <a:rPr lang="ru-RU" sz="1300" dirty="0" err="1">
+                <a:hlinkClick r:id="rId5"/>
+              </a:rPr>
               <a:t>Лю</a:t>
             </a:r>
             <a:r>
-              <a:rPr lang="ru-RU" sz="1300" dirty="0"/>
+              <a:rPr lang="ru-RU" sz="1300" dirty="0">
+                <a:hlinkClick r:id="rId5"/>
+              </a:rPr>
               <a:t> Ю. (Х.) Обучение с подкреплением на </a:t>
             </a:r>
             <a:r>
-              <a:rPr lang="en-GB" sz="1300" dirty="0" err="1"/>
+              <a:rPr lang="en-GB" sz="1300" dirty="0" err="1">
+                <a:hlinkClick r:id="rId5"/>
+              </a:rPr>
               <a:t>PyTorch</a:t>
             </a:r>
             <a:r>
-              <a:rPr lang="en-GB" sz="1300" dirty="0"/>
+              <a:rPr lang="en-GB" sz="1300" dirty="0">
+                <a:hlinkClick r:id="rId5"/>
+              </a:rPr>
               <a:t>: </a:t>
             </a:r>
             <a:r>
-              <a:rPr lang="ru-RU" sz="1300" dirty="0"/>
+              <a:rPr lang="ru-RU" sz="1300" dirty="0">
+                <a:hlinkClick r:id="rId5"/>
+              </a:rPr>
               <a:t>сборник рецептов / пер. с англ. А. А. </a:t>
             </a:r>
             <a:r>
-              <a:rPr lang="ru-RU" sz="1300" dirty="0" err="1"/>
+              <a:rPr lang="ru-RU" sz="1300" dirty="0" err="1">
+                <a:hlinkClick r:id="rId5"/>
+              </a:rPr>
               <a:t>Слинкина</a:t>
             </a:r>
             <a:r>
-              <a:rPr lang="ru-RU" sz="1300" dirty="0"/>
+              <a:rPr lang="ru-RU" sz="1300" dirty="0">
+                <a:hlinkClick r:id="rId5"/>
+              </a:rPr>
               <a:t>. – М.: ДМК Пресс, 2020. – 282 с. </a:t>
             </a:r>
+            <a:endParaRPr lang="ru-RU" sz="1300" dirty="0"/>
+          </a:p>
+          <a:p>
+            <a:pPr indent="-311150">
+              <a:buSzPts val="1300"/>
+              <a:buFont typeface="Roboto"/>
+              <a:buAutoNum type="arabicPeriod"/>
+            </a:pPr>
             <a:r>
-              <a:rPr lang="en-US" sz="1300" dirty="0">
-                <a:hlinkClick r:id="rId5"/>
+              <a:rPr lang="ru-RU" sz="1300" dirty="0">
+                <a:hlinkClick r:id="rId6"/>
               </a:rPr>
-              <a:t>link</a:t>
+              <a:t>Недостатки/неудачи обучения с подкреплением</a:t>
+            </a:r>
+            <a:endParaRPr lang="en-US" sz="1300" dirty="0"/>
+          </a:p>
+          <a:p>
+            <a:pPr indent="-311150">
+              <a:buSzPts val="1300"/>
+              <a:buFont typeface="Roboto"/>
+              <a:buAutoNum type="arabicPeriod"/>
+            </a:pPr>
+            <a:r>
+              <a:rPr lang="ru-RU" sz="1300" dirty="0">
+                <a:hlinkClick r:id="rId7"/>
+              </a:rPr>
+              <a:t>Обзор алгоритмов и их недостатков</a:t>
             </a:r>
             <a:endParaRPr lang="ru-RU" sz="1300" dirty="0"/>
+          </a:p>
+          <a:p>
+            <a:pPr indent="-311150">
+              <a:buSzPts val="1300"/>
+              <a:buFont typeface="Roboto"/>
+              <a:buAutoNum type="arabicPeriod"/>
+            </a:pPr>
+            <a:r>
+              <a:rPr lang="ru-RU" sz="1300" dirty="0">
+                <a:hlinkClick r:id="rId8"/>
+              </a:rPr>
+              <a:t>Особенности основных алгоритмов</a:t>
+            </a:r>
+            <a:endParaRPr lang="ru-RU" sz="1300" dirty="0"/>
+          </a:p>
+          <a:p>
+            <a:pPr indent="-311150">
+              <a:buSzPts val="1300"/>
+              <a:buFont typeface="Roboto"/>
+              <a:buAutoNum type="arabicPeriod"/>
+            </a:pPr>
+            <a:r>
+              <a:rPr lang="ru-RU" sz="1300" b="0" i="0" u="none" strike="noStrike" dirty="0">
+                <a:solidFill>
+                  <a:srgbClr val="333333"/>
+                </a:solidFill>
+                <a:effectLst/>
+                <a:latin typeface=""/>
+                <a:hlinkClick r:id="rId9"/>
+              </a:rPr>
+              <a:t>Эволюционные стратегии в </a:t>
+            </a:r>
+            <a:r>
+              <a:rPr lang="en-US" sz="1300" b="0" i="0" u="none" strike="noStrike" dirty="0">
+                <a:solidFill>
+                  <a:srgbClr val="333333"/>
+                </a:solidFill>
+                <a:effectLst/>
+                <a:latin typeface=""/>
+                <a:hlinkClick r:id="rId9"/>
+              </a:rPr>
+              <a:t>RL</a:t>
+            </a:r>
+            <a:endParaRPr lang="ru-RU" sz="1300" b="0" i="0" u="none" strike="noStrike" dirty="0">
+              <a:solidFill>
+                <a:srgbClr val="333333"/>
+              </a:solidFill>
+              <a:effectLst/>
+              <a:latin typeface=""/>
+            </a:endParaRPr>
           </a:p>
           <a:p>
             <a:pPr indent="-311150">

</xml_diff>